<commit_message>
fixed image in slide
</commit_message>
<xml_diff>
--- a/ppt/5gakaPpt.pptx
+++ b/ppt/5gakaPpt.pptx
@@ -2752,7 +2752,43 @@
               <a:rPr b="0" lang="en-US" sz="4400" spc="-1" strike="noStrike">
                 <a:latin typeface="Arial"/>
               </a:rPr>
-              <a:t>Click to edit the title text format</a:t>
+              <a:t>Click </a:t>
+            </a:r>
+            <a:r>
+              <a:rPr b="0" lang="en-US" sz="4400" spc="-1" strike="noStrike">
+                <a:latin typeface="Arial"/>
+              </a:rPr>
+              <a:t>to edit </a:t>
+            </a:r>
+            <a:r>
+              <a:rPr b="0" lang="en-US" sz="4400" spc="-1" strike="noStrike">
+                <a:latin typeface="Arial"/>
+              </a:rPr>
+              <a:t>the </a:t>
+            </a:r>
+            <a:r>
+              <a:rPr b="0" lang="en-US" sz="4400" spc="-1" strike="noStrike">
+                <a:latin typeface="Arial"/>
+              </a:rPr>
+              <a:t>title </a:t>
+            </a:r>
+            <a:r>
+              <a:rPr b="0" lang="en-US" sz="4400" spc="-1" strike="noStrike">
+                <a:latin typeface="Arial"/>
+              </a:rPr>
+              <a:t>text </a:t>
+            </a:r>
+            <a:r>
+              <a:rPr b="0" lang="en-US" sz="4400" spc="-1" strike="noStrike">
+                <a:latin typeface="Arial"/>
+              </a:rPr>
+              <a:t>forma</a:t>
+            </a:r>
+            <a:r>
+              <a:rPr b="0" lang="en-US" sz="4400" spc="-1" strike="noStrike">
+                <a:latin typeface="Arial"/>
+              </a:rPr>
+              <a:t>t</a:t>
             </a:r>
             <a:endParaRPr b="0" lang="en-US" sz="4400" spc="-1" strike="noStrike">
               <a:latin typeface="Arial"/>
@@ -3256,7 +3292,7 @@
         <p:spPr>
           <a:xfrm>
             <a:off x="684360" y="2205000"/>
-            <a:ext cx="7769880" cy="1467720"/>
+            <a:ext cx="7769520" cy="1467360"/>
           </a:xfrm>
           <a:prstGeom prst="rect">
             <a:avLst/>
@@ -3375,7 +3411,7 @@
         <p:spPr>
           <a:xfrm>
             <a:off x="0" y="274320"/>
-            <a:ext cx="7405560" cy="1003680"/>
+            <a:ext cx="7405200" cy="1003320"/>
           </a:xfrm>
           <a:prstGeom prst="rect">
             <a:avLst/>
@@ -3436,7 +3472,7 @@
         <p:spPr>
           <a:xfrm>
             <a:off x="169200" y="1456200"/>
-            <a:ext cx="6779160" cy="2657520"/>
+            <a:ext cx="6778800" cy="2657160"/>
           </a:xfrm>
           <a:prstGeom prst="rect">
             <a:avLst/>
@@ -3457,7 +3493,7 @@
             <a:normAutofit/>
           </a:bodyPr>
           <a:p>
-            <a:pPr marL="182880" indent="-340200">
+            <a:pPr marL="182880" indent="-339840">
               <a:lnSpc>
                 <a:spcPct val="100000"/>
               </a:lnSpc>
@@ -3485,7 +3521,7 @@
             </a:endParaRPr>
           </a:p>
           <a:p>
-            <a:pPr marL="311040" indent="-340200">
+            <a:pPr marL="311040" indent="-339840">
               <a:lnSpc>
                 <a:spcPct val="100000"/>
               </a:lnSpc>
@@ -3513,7 +3549,7 @@
             </a:endParaRPr>
           </a:p>
           <a:p>
-            <a:pPr marL="311040" indent="-340200">
+            <a:pPr marL="311040" indent="-339840">
               <a:lnSpc>
                 <a:spcPct val="100000"/>
               </a:lnSpc>
@@ -3541,7 +3577,7 @@
             </a:endParaRPr>
           </a:p>
           <a:p>
-            <a:pPr marL="311040" indent="-340200">
+            <a:pPr marL="311040" indent="-339840">
               <a:lnSpc>
                 <a:spcPct val="100000"/>
               </a:lnSpc>
@@ -3569,7 +3605,7 @@
             </a:endParaRPr>
           </a:p>
           <a:p>
-            <a:pPr marL="311040" indent="-340200">
+            <a:pPr marL="311040" indent="-339840">
               <a:lnSpc>
                 <a:spcPct val="100000"/>
               </a:lnSpc>
@@ -3721,7 +3757,7 @@
         <p:spPr>
           <a:xfrm>
             <a:off x="0" y="274320"/>
-            <a:ext cx="7587360" cy="1034280"/>
+            <a:ext cx="7587000" cy="1033920"/>
           </a:xfrm>
           <a:prstGeom prst="rect">
             <a:avLst/>
@@ -3776,7 +3812,7 @@
         <p:spPr>
           <a:xfrm>
             <a:off x="457200" y="2136240"/>
-            <a:ext cx="6123960" cy="2446920"/>
+            <a:ext cx="6123600" cy="2446560"/>
           </a:xfrm>
           <a:prstGeom prst="rect">
             <a:avLst/>
@@ -3844,7 +3880,7 @@
         <p:spPr>
           <a:xfrm>
             <a:off x="0" y="274320"/>
-            <a:ext cx="7404480" cy="912240"/>
+            <a:ext cx="7404120" cy="911880"/>
           </a:xfrm>
           <a:prstGeom prst="rect">
             <a:avLst/>
@@ -3899,7 +3935,7 @@
         <p:spPr>
           <a:xfrm>
             <a:off x="548640" y="1554480"/>
-            <a:ext cx="6307200" cy="3197880"/>
+            <a:ext cx="6306840" cy="3197520"/>
           </a:xfrm>
           <a:prstGeom prst="rect">
             <a:avLst/>
@@ -3977,7 +4013,7 @@
         <p:spPr>
           <a:xfrm>
             <a:off x="0" y="274320"/>
-            <a:ext cx="9143640" cy="912240"/>
+            <a:ext cx="9143280" cy="911880"/>
           </a:xfrm>
           <a:prstGeom prst="rect">
             <a:avLst/>
@@ -4028,7 +4064,7 @@
         <p:spPr>
           <a:xfrm>
             <a:off x="17076240" y="9692280"/>
-            <a:ext cx="2422800" cy="1188360"/>
+            <a:ext cx="2422440" cy="1188000"/>
           </a:xfrm>
           <a:prstGeom prst="rect">
             <a:avLst/>
@@ -4054,11 +4090,113 @@
             </a:pPr>
             <a:r>
               <a:rPr b="0" lang="en-US" sz="3200" spc="-1" strike="noStrike">
-                <a:latin typeface="Arial"/>
+                <a:solidFill>
+                  <a:srgbClr val="000000"/>
+                </a:solidFill>
+                <a:latin typeface="Arial"/>
+                <a:ea typeface="DejaVu Sans"/>
               </a:rPr>
               <a:t>XRES*</a:t>
             </a:r>
             <a:endParaRPr b="0" lang="en-US" sz="3200" spc="-1" strike="noStrike">
+              <a:latin typeface="Arial"/>
+            </a:endParaRPr>
+          </a:p>
+        </p:txBody>
+      </p:sp>
+      <p:sp>
+        <p:nvSpPr>
+          <p:cNvPr id="105" name="CustomShape 3"/>
+          <p:cNvSpPr/>
+          <p:nvPr/>
+        </p:nvSpPr>
+        <p:spPr>
+          <a:xfrm>
+            <a:off x="1415520" y="5943600"/>
+            <a:ext cx="1736640" cy="345600"/>
+          </a:xfrm>
+          <a:prstGeom prst="rect">
+            <a:avLst/>
+          </a:prstGeom>
+          <a:noFill/>
+          <a:ln>
+            <a:noFill/>
+          </a:ln>
+        </p:spPr>
+        <p:style>
+          <a:lnRef idx="0"/>
+          <a:fillRef idx="0"/>
+          <a:effectRef idx="0"/>
+          <a:fontRef idx="minor"/>
+        </p:style>
+        <p:txBody>
+          <a:bodyPr lIns="90000" rIns="90000" tIns="45000" bIns="45000"/>
+          <a:p>
+            <a:pPr algn="ctr">
+              <a:lnSpc>
+                <a:spcPct val="100000"/>
+              </a:lnSpc>
+            </a:pPr>
+            <a:r>
+              <a:rPr b="0" lang="en-US" sz="1800" spc="-1" strike="noStrike">
+                <a:solidFill>
+                  <a:srgbClr val="000000"/>
+                </a:solidFill>
+                <a:latin typeface="Arial"/>
+                <a:ea typeface="DejaVu Sans"/>
+              </a:rPr>
+              <a:t>ARPF</a:t>
+            </a:r>
+            <a:endParaRPr b="0" lang="en-US" sz="1800" spc="-1" strike="noStrike">
+              <a:latin typeface="Arial"/>
+            </a:endParaRPr>
+          </a:p>
+        </p:txBody>
+      </p:sp>
+      <p:sp>
+        <p:nvSpPr>
+          <p:cNvPr id="106" name="CustomShape 4"/>
+          <p:cNvSpPr/>
+          <p:nvPr/>
+        </p:nvSpPr>
+        <p:spPr>
+          <a:xfrm>
+            <a:off x="6397920" y="5938920"/>
+            <a:ext cx="1370880" cy="345600"/>
+          </a:xfrm>
+          <a:prstGeom prst="rect">
+            <a:avLst/>
+          </a:prstGeom>
+          <a:noFill/>
+          <a:ln>
+            <a:noFill/>
+          </a:ln>
+        </p:spPr>
+        <p:style>
+          <a:lnRef idx="0"/>
+          <a:fillRef idx="0"/>
+          <a:effectRef idx="0"/>
+          <a:fontRef idx="minor"/>
+        </p:style>
+        <p:txBody>
+          <a:bodyPr lIns="90000" rIns="90000" tIns="45000" bIns="45000"/>
+          <a:p>
+            <a:pPr algn="ctr">
+              <a:lnSpc>
+                <a:spcPct val="100000"/>
+              </a:lnSpc>
+            </a:pPr>
+            <a:r>
+              <a:rPr b="0" lang="en-US" sz="1800" spc="-1" strike="noStrike">
+                <a:solidFill>
+                  <a:srgbClr val="000000"/>
+                </a:solidFill>
+                <a:latin typeface="Arial"/>
+                <a:ea typeface="DejaVu Sans"/>
+              </a:rPr>
+              <a:t>UE</a:t>
+            </a:r>
+            <a:endParaRPr b="0" lang="en-US" sz="1800" spc="-1" strike="noStrike">
               <a:latin typeface="Arial"/>
             </a:endParaRPr>
           </a:p>
@@ -4066,7 +4204,7 @@
       </p:sp>
       <p:pic>
         <p:nvPicPr>
-          <p:cNvPr id="105" name="" descr=""/>
+          <p:cNvPr id="107" name="" descr=""/>
           <p:cNvPicPr/>
           <p:nvPr/>
         </p:nvPicPr>
@@ -4076,8 +4214,8 @@
         </p:blipFill>
         <p:spPr>
           <a:xfrm>
-            <a:off x="4699440" y="1438920"/>
-            <a:ext cx="4571640" cy="4571640"/>
+            <a:off x="354960" y="1505160"/>
+            <a:ext cx="5029200" cy="3749040"/>
           </a:xfrm>
           <a:prstGeom prst="rect">
             <a:avLst/>
@@ -4089,7 +4227,7 @@
       </p:pic>
       <p:pic>
         <p:nvPicPr>
-          <p:cNvPr id="106" name="" descr=""/>
+          <p:cNvPr id="108" name="" descr=""/>
           <p:cNvPicPr/>
           <p:nvPr/>
         </p:nvPicPr>
@@ -4099,8 +4237,8 @@
         </p:blipFill>
         <p:spPr>
           <a:xfrm>
-            <a:off x="274320" y="1371600"/>
-            <a:ext cx="4571640" cy="4571640"/>
+            <a:off x="5352480" y="1544400"/>
+            <a:ext cx="3840480" cy="3840480"/>
           </a:xfrm>
           <a:prstGeom prst="rect">
             <a:avLst/>
@@ -4110,96 +4248,6 @@
           </a:ln>
         </p:spPr>
       </p:pic>
-      <p:sp>
-        <p:nvSpPr>
-          <p:cNvPr id="107" name="CustomShape 3"/>
-          <p:cNvSpPr/>
-          <p:nvPr/>
-        </p:nvSpPr>
-        <p:spPr>
-          <a:xfrm>
-            <a:off x="731520" y="5943600"/>
-            <a:ext cx="1737000" cy="345960"/>
-          </a:xfrm>
-          <a:prstGeom prst="rect">
-            <a:avLst/>
-          </a:prstGeom>
-          <a:noFill/>
-          <a:ln>
-            <a:noFill/>
-          </a:ln>
-        </p:spPr>
-        <p:style>
-          <a:lnRef idx="0"/>
-          <a:fillRef idx="0"/>
-          <a:effectRef idx="0"/>
-          <a:fontRef idx="minor"/>
-        </p:style>
-        <p:txBody>
-          <a:bodyPr lIns="90000" rIns="90000" tIns="45000" bIns="45000"/>
-          <a:p>
-            <a:pPr algn="ctr">
-              <a:lnSpc>
-                <a:spcPct val="100000"/>
-              </a:lnSpc>
-            </a:pPr>
-            <a:r>
-              <a:rPr b="0" lang="en-US" sz="1800" spc="-1" strike="noStrike">
-                <a:latin typeface="Arial"/>
-              </a:rPr>
-              <a:t>ARPF</a:t>
-            </a:r>
-            <a:endParaRPr b="0" lang="en-US" sz="1800" spc="-1" strike="noStrike">
-              <a:latin typeface="Arial"/>
-            </a:endParaRPr>
-          </a:p>
-        </p:txBody>
-      </p:sp>
-      <p:sp>
-        <p:nvSpPr>
-          <p:cNvPr id="108" name="CustomShape 4"/>
-          <p:cNvSpPr/>
-          <p:nvPr/>
-        </p:nvSpPr>
-        <p:spPr>
-          <a:xfrm>
-            <a:off x="6109920" y="5938920"/>
-            <a:ext cx="1371240" cy="345960"/>
-          </a:xfrm>
-          <a:prstGeom prst="rect">
-            <a:avLst/>
-          </a:prstGeom>
-          <a:noFill/>
-          <a:ln>
-            <a:noFill/>
-          </a:ln>
-        </p:spPr>
-        <p:style>
-          <a:lnRef idx="0"/>
-          <a:fillRef idx="0"/>
-          <a:effectRef idx="0"/>
-          <a:fontRef idx="minor"/>
-        </p:style>
-        <p:txBody>
-          <a:bodyPr lIns="90000" rIns="90000" tIns="45000" bIns="45000"/>
-          <a:p>
-            <a:pPr algn="ctr">
-              <a:lnSpc>
-                <a:spcPct val="100000"/>
-              </a:lnSpc>
-            </a:pPr>
-            <a:r>
-              <a:rPr b="0" lang="en-US" sz="1800" spc="-1" strike="noStrike">
-                <a:latin typeface="Arial"/>
-              </a:rPr>
-              <a:t>UE</a:t>
-            </a:r>
-            <a:endParaRPr b="0" lang="en-US" sz="1800" spc="-1" strike="noStrike">
-              <a:latin typeface="Arial"/>
-            </a:endParaRPr>
-          </a:p>
-        </p:txBody>
-      </p:sp>
     </p:spTree>
   </p:cSld>
   <p:timing>
@@ -4258,7 +4306,7 @@
         <p:spPr>
           <a:xfrm>
             <a:off x="0" y="274320"/>
-            <a:ext cx="7495920" cy="1140480"/>
+            <a:ext cx="7495560" cy="1140120"/>
           </a:xfrm>
           <a:prstGeom prst="rect">
             <a:avLst/>
@@ -4319,7 +4367,7 @@
         <p:spPr>
           <a:xfrm>
             <a:off x="457200" y="1600200"/>
-            <a:ext cx="6581160" cy="4523400"/>
+            <a:ext cx="6580800" cy="4523040"/>
           </a:xfrm>
           <a:prstGeom prst="rect">
             <a:avLst/>
@@ -4340,7 +4388,7 @@
             <a:normAutofit/>
           </a:bodyPr>
           <a:p>
-            <a:pPr marL="342720" indent="-340200">
+            <a:pPr marL="342720" indent="-339840">
               <a:lnSpc>
                 <a:spcPct val="100000"/>
               </a:lnSpc>
@@ -4368,7 +4416,7 @@
             </a:endParaRPr>
           </a:p>
           <a:p>
-            <a:pPr marL="342720" indent="-340200">
+            <a:pPr marL="342720" indent="-339840">
               <a:lnSpc>
                 <a:spcPct val="100000"/>
               </a:lnSpc>
@@ -4396,7 +4444,7 @@
             </a:endParaRPr>
           </a:p>
           <a:p>
-            <a:pPr marL="342720" indent="-340200">
+            <a:pPr marL="342720" indent="-339840">
               <a:lnSpc>
                 <a:spcPct val="100000"/>
               </a:lnSpc>
@@ -4483,7 +4531,7 @@
         <p:spPr>
           <a:xfrm>
             <a:off x="0" y="274320"/>
-            <a:ext cx="7495920" cy="1003680"/>
+            <a:ext cx="7495560" cy="1003320"/>
           </a:xfrm>
           <a:prstGeom prst="rect">
             <a:avLst/>
@@ -4544,7 +4592,7 @@
         <p:spPr>
           <a:xfrm>
             <a:off x="457200" y="1600200"/>
-            <a:ext cx="6581160" cy="4523400"/>
+            <a:ext cx="6580800" cy="4523040"/>
           </a:xfrm>
           <a:prstGeom prst="rect">
             <a:avLst/>
@@ -4565,7 +4613,7 @@
             <a:normAutofit/>
           </a:bodyPr>
           <a:p>
-            <a:pPr marL="342720" indent="-340200">
+            <a:pPr marL="342720" indent="-339840">
               <a:lnSpc>
                 <a:spcPct val="100000"/>
               </a:lnSpc>
@@ -4593,7 +4641,7 @@
             </a:endParaRPr>
           </a:p>
           <a:p>
-            <a:pPr marL="342720" indent="-340200">
+            <a:pPr marL="342720" indent="-339840">
               <a:lnSpc>
                 <a:spcPct val="100000"/>
               </a:lnSpc>
@@ -4632,7 +4680,7 @@
             </a:endParaRPr>
           </a:p>
           <a:p>
-            <a:pPr marL="342720" indent="-340200">
+            <a:pPr marL="342720" indent="-339840">
               <a:lnSpc>
                 <a:spcPct val="100000"/>
               </a:lnSpc>
@@ -4730,7 +4778,7 @@
         <p:spPr>
           <a:xfrm>
             <a:off x="0" y="274320"/>
-            <a:ext cx="7495920" cy="1140480"/>
+            <a:ext cx="7495560" cy="1140120"/>
           </a:xfrm>
           <a:prstGeom prst="rect">
             <a:avLst/>
@@ -4791,7 +4839,7 @@
         <p:spPr>
           <a:xfrm>
             <a:off x="457200" y="1600200"/>
-            <a:ext cx="8227080" cy="4523400"/>
+            <a:ext cx="8226720" cy="4523040"/>
           </a:xfrm>
           <a:prstGeom prst="rect">
             <a:avLst/>
@@ -4812,7 +4860,7 @@
             <a:normAutofit/>
           </a:bodyPr>
           <a:p>
-            <a:pPr marL="342720" indent="-340200">
+            <a:pPr marL="342720" indent="-339840">
               <a:lnSpc>
                 <a:spcPct val="100000"/>
               </a:lnSpc>
@@ -4840,7 +4888,7 @@
             </a:endParaRPr>
           </a:p>
           <a:p>
-            <a:pPr marL="164520" indent="-340200">
+            <a:pPr marL="164520" indent="-339840">
               <a:lnSpc>
                 <a:spcPct val="100000"/>
               </a:lnSpc>
@@ -4868,7 +4916,7 @@
             </a:endParaRPr>
           </a:p>
           <a:p>
-            <a:pPr marL="164520" indent="-340200">
+            <a:pPr marL="164520" indent="-339840">
               <a:lnSpc>
                 <a:spcPct val="100000"/>
               </a:lnSpc>
@@ -4896,7 +4944,7 @@
             </a:endParaRPr>
           </a:p>
           <a:p>
-            <a:pPr marL="164520" indent="-340200">
+            <a:pPr marL="164520" indent="-339840">
               <a:lnSpc>
                 <a:spcPct val="100000"/>
               </a:lnSpc>
@@ -4924,7 +4972,7 @@
             </a:endParaRPr>
           </a:p>
           <a:p>
-            <a:pPr marL="164520" indent="-340200">
+            <a:pPr marL="164520" indent="-339840">
               <a:lnSpc>
                 <a:spcPct val="100000"/>
               </a:lnSpc>
@@ -5024,7 +5072,7 @@
         <p:spPr>
           <a:xfrm>
             <a:off x="0" y="274320"/>
-            <a:ext cx="7404480" cy="1003680"/>
+            <a:ext cx="7404120" cy="1003320"/>
           </a:xfrm>
           <a:prstGeom prst="rect">
             <a:avLst/>
@@ -5085,7 +5133,7 @@
         <p:spPr>
           <a:xfrm>
             <a:off x="457200" y="1600200"/>
-            <a:ext cx="6672600" cy="4523400"/>
+            <a:ext cx="6672240" cy="4523040"/>
           </a:xfrm>
           <a:prstGeom prst="rect">
             <a:avLst/>
@@ -5106,7 +5154,7 @@
             <a:normAutofit/>
           </a:bodyPr>
           <a:p>
-            <a:pPr marL="342720" indent="-340200">
+            <a:pPr marL="342720" indent="-339840">
               <a:lnSpc>
                 <a:spcPct val="100000"/>
               </a:lnSpc>
@@ -5134,7 +5182,7 @@
             </a:endParaRPr>
           </a:p>
           <a:p>
-            <a:pPr marL="342720" indent="-340200">
+            <a:pPr marL="342720" indent="-339840">
               <a:lnSpc>
                 <a:spcPct val="100000"/>
               </a:lnSpc>
@@ -5162,7 +5210,7 @@
             </a:endParaRPr>
           </a:p>
           <a:p>
-            <a:pPr marL="342720" indent="-340200">
+            <a:pPr marL="342720" indent="-339840">
               <a:lnSpc>
                 <a:spcPct val="100000"/>
               </a:lnSpc>
@@ -5249,7 +5297,7 @@
         <p:spPr>
           <a:xfrm>
             <a:off x="0" y="274320"/>
-            <a:ext cx="7404480" cy="1003680"/>
+            <a:ext cx="7404120" cy="1003320"/>
           </a:xfrm>
           <a:prstGeom prst="rect">
             <a:avLst/>
@@ -5310,7 +5358,7 @@
         <p:spPr>
           <a:xfrm>
             <a:off x="457200" y="1600200"/>
-            <a:ext cx="6672600" cy="4523400"/>
+            <a:ext cx="6672240" cy="4523040"/>
           </a:xfrm>
           <a:prstGeom prst="rect">
             <a:avLst/>
@@ -5354,7 +5402,7 @@
             </a:endParaRPr>
           </a:p>
           <a:p>
-            <a:pPr marL="216000" indent="-216000">
+            <a:pPr marL="216000" indent="-215640">
               <a:lnSpc>
                 <a:spcPct val="100000"/>
               </a:lnSpc>
@@ -5382,7 +5430,7 @@
             </a:endParaRPr>
           </a:p>
           <a:p>
-            <a:pPr marL="216000" indent="-216000">
+            <a:pPr marL="216000" indent="-215640">
               <a:lnSpc>
                 <a:spcPct val="100000"/>
               </a:lnSpc>
@@ -5469,7 +5517,7 @@
         <p:spPr>
           <a:xfrm>
             <a:off x="0" y="274320"/>
-            <a:ext cx="7404480" cy="1003680"/>
+            <a:ext cx="7404120" cy="1003320"/>
           </a:xfrm>
           <a:prstGeom prst="rect">
             <a:avLst/>
@@ -5530,7 +5578,7 @@
         <p:spPr>
           <a:xfrm>
             <a:off x="457200" y="1600200"/>
-            <a:ext cx="6672600" cy="4523400"/>
+            <a:ext cx="6672240" cy="4523040"/>
           </a:xfrm>
           <a:prstGeom prst="rect">
             <a:avLst/>
@@ -5560,7 +5608,7 @@
         <p:spPr>
           <a:xfrm>
             <a:off x="980640" y="1427040"/>
-            <a:ext cx="5029200" cy="4046040"/>
+            <a:ext cx="5028840" cy="4045680"/>
           </a:xfrm>
           <a:prstGeom prst="rect">
             <a:avLst/>
@@ -5628,7 +5676,7 @@
         <p:spPr>
           <a:xfrm>
             <a:off x="0" y="274320"/>
-            <a:ext cx="7404480" cy="820800"/>
+            <a:ext cx="7404120" cy="820440"/>
           </a:xfrm>
           <a:prstGeom prst="rect">
             <a:avLst/>
@@ -5683,7 +5731,7 @@
         <p:spPr>
           <a:xfrm>
             <a:off x="414720" y="1417320"/>
-            <a:ext cx="6349320" cy="4523400"/>
+            <a:ext cx="6348960" cy="4523040"/>
           </a:xfrm>
           <a:prstGeom prst="rect">
             <a:avLst/>
@@ -5751,7 +5799,7 @@
         <p:spPr>
           <a:xfrm>
             <a:off x="0" y="274320"/>
-            <a:ext cx="7495920" cy="1003680"/>
+            <a:ext cx="7495560" cy="1003320"/>
           </a:xfrm>
           <a:prstGeom prst="rect">
             <a:avLst/>
@@ -5812,7 +5860,7 @@
         <p:spPr>
           <a:xfrm>
             <a:off x="457200" y="1600200"/>
-            <a:ext cx="8227080" cy="4523400"/>
+            <a:ext cx="8226720" cy="4523040"/>
           </a:xfrm>
           <a:prstGeom prst="rect">
             <a:avLst/>
@@ -5887,7 +5935,7 @@
         <p:spPr>
           <a:xfrm>
             <a:off x="0" y="274320"/>
-            <a:ext cx="7495920" cy="1003680"/>
+            <a:ext cx="7495560" cy="1003320"/>
           </a:xfrm>
           <a:prstGeom prst="rect">
             <a:avLst/>
@@ -5948,7 +5996,7 @@
         <p:spPr>
           <a:xfrm>
             <a:off x="457200" y="1600200"/>
-            <a:ext cx="8227080" cy="4523400"/>
+            <a:ext cx="8226720" cy="4523040"/>
           </a:xfrm>
           <a:prstGeom prst="rect">
             <a:avLst/>
@@ -6023,7 +6071,7 @@
         <p:spPr>
           <a:xfrm>
             <a:off x="0" y="274320"/>
-            <a:ext cx="7404480" cy="1003680"/>
+            <a:ext cx="7404120" cy="1003320"/>
           </a:xfrm>
           <a:prstGeom prst="rect">
             <a:avLst/>
@@ -6074,7 +6122,7 @@
         <p:spPr>
           <a:xfrm>
             <a:off x="457200" y="1600200"/>
-            <a:ext cx="8227080" cy="4523400"/>
+            <a:ext cx="8226720" cy="4523040"/>
           </a:xfrm>
           <a:prstGeom prst="rect">
             <a:avLst/>
@@ -6159,7 +6207,7 @@
         <p:spPr>
           <a:xfrm>
             <a:off x="0" y="274320"/>
-            <a:ext cx="9142200" cy="1003680"/>
+            <a:ext cx="9141840" cy="1003320"/>
           </a:xfrm>
           <a:prstGeom prst="rect">
             <a:avLst/>
@@ -6220,7 +6268,7 @@
         <p:spPr>
           <a:xfrm>
             <a:off x="457200" y="1456200"/>
-            <a:ext cx="7953840" cy="736920"/>
+            <a:ext cx="7953480" cy="736560"/>
           </a:xfrm>
           <a:prstGeom prst="rect">
             <a:avLst/>
@@ -6241,7 +6289,7 @@
             <a:normAutofit/>
           </a:bodyPr>
           <a:p>
-            <a:pPr marL="182880" indent="-340200">
+            <a:pPr marL="182880" indent="-339840">
               <a:lnSpc>
                 <a:spcPct val="100000"/>
               </a:lnSpc>
@@ -6269,7 +6317,7 @@
             </a:endParaRPr>
           </a:p>
           <a:p>
-            <a:pPr marL="182880" indent="-340200">
+            <a:pPr marL="182880" indent="-339840">
               <a:lnSpc>
                 <a:spcPct val="100000"/>
               </a:lnSpc>
@@ -6350,7 +6398,7 @@
         <p:spPr>
           <a:xfrm>
             <a:off x="3321360" y="2194560"/>
-            <a:ext cx="5484960" cy="3034440"/>
+            <a:ext cx="5484600" cy="3034080"/>
           </a:xfrm>
           <a:prstGeom prst="rect">
             <a:avLst/>
@@ -6369,7 +6417,7 @@
         <p:spPr>
           <a:xfrm>
             <a:off x="640080" y="2869200"/>
-            <a:ext cx="2558880" cy="1368720"/>
+            <a:ext cx="2558520" cy="1368360"/>
           </a:xfrm>
           <a:prstGeom prst="rect">
             <a:avLst/>
@@ -6388,7 +6436,7 @@
         <p:txBody>
           <a:bodyPr lIns="90000" rIns="90000" tIns="45000" bIns="45000"/>
           <a:p>
-            <a:pPr marL="216000" indent="-214560">
+            <a:pPr marL="216000" indent="-214200">
               <a:lnSpc>
                 <a:spcPct val="100000"/>
               </a:lnSpc>
@@ -6414,7 +6462,7 @@
             </a:endParaRPr>
           </a:p>
           <a:p>
-            <a:pPr marL="216000" indent="-214560">
+            <a:pPr marL="216000" indent="-214200">
               <a:lnSpc>
                 <a:spcPct val="100000"/>
               </a:lnSpc>
@@ -6440,7 +6488,7 @@
             </a:endParaRPr>
           </a:p>
           <a:p>
-            <a:pPr marL="216000" indent="-214560">
+            <a:pPr marL="216000" indent="-214200">
               <a:lnSpc>
                 <a:spcPct val="100000"/>
               </a:lnSpc>
@@ -6466,7 +6514,7 @@
             </a:endParaRPr>
           </a:p>
           <a:p>
-            <a:pPr marL="216000" indent="-214560">
+            <a:pPr marL="216000" indent="-214200">
               <a:lnSpc>
                 <a:spcPct val="100000"/>
               </a:lnSpc>
@@ -6561,7 +6609,7 @@
         <p:spPr>
           <a:xfrm>
             <a:off x="0" y="274320"/>
-            <a:ext cx="9142200" cy="1003680"/>
+            <a:ext cx="9141840" cy="1003320"/>
           </a:xfrm>
           <a:prstGeom prst="rect">
             <a:avLst/>
@@ -6622,7 +6670,7 @@
         <p:spPr>
           <a:xfrm>
             <a:off x="169200" y="1456200"/>
-            <a:ext cx="4662360" cy="2657520"/>
+            <a:ext cx="4662000" cy="2657160"/>
           </a:xfrm>
           <a:prstGeom prst="rect">
             <a:avLst/>
@@ -6643,7 +6691,7 @@
             <a:normAutofit/>
           </a:bodyPr>
           <a:p>
-            <a:pPr marL="182880" indent="-340200">
+            <a:pPr marL="182880" indent="-339840">
               <a:lnSpc>
                 <a:spcPct val="100000"/>
               </a:lnSpc>
@@ -6671,7 +6719,7 @@
             </a:endParaRPr>
           </a:p>
           <a:p>
-            <a:pPr marL="311040" indent="-340200">
+            <a:pPr marL="311040" indent="-339840">
               <a:lnSpc>
                 <a:spcPct val="100000"/>
               </a:lnSpc>
@@ -6699,7 +6747,7 @@
             </a:endParaRPr>
           </a:p>
           <a:p>
-            <a:pPr marL="311040" indent="-340200">
+            <a:pPr marL="311040" indent="-339840">
               <a:lnSpc>
                 <a:spcPct val="100000"/>
               </a:lnSpc>
@@ -6727,7 +6775,7 @@
             </a:endParaRPr>
           </a:p>
           <a:p>
-            <a:pPr marL="311040" indent="-340200">
+            <a:pPr marL="311040" indent="-339840">
               <a:lnSpc>
                 <a:spcPct val="100000"/>
               </a:lnSpc>
@@ -6755,7 +6803,7 @@
             </a:endParaRPr>
           </a:p>
           <a:p>
-            <a:pPr marL="311040" indent="-340200">
+            <a:pPr marL="311040" indent="-339840">
               <a:lnSpc>
                 <a:spcPct val="100000"/>
               </a:lnSpc>
@@ -6849,7 +6897,7 @@
         <p:spPr>
           <a:xfrm>
             <a:off x="4921200" y="1828080"/>
-            <a:ext cx="3987000" cy="2537640"/>
+            <a:ext cx="3986640" cy="2537280"/>
           </a:xfrm>
           <a:prstGeom prst="rect">
             <a:avLst/>
@@ -6917,7 +6965,7 @@
         <p:spPr>
           <a:xfrm>
             <a:off x="0" y="274320"/>
-            <a:ext cx="7404480" cy="1095120"/>
+            <a:ext cx="7404120" cy="1094760"/>
           </a:xfrm>
           <a:prstGeom prst="rect">
             <a:avLst/>
@@ -6978,7 +7026,7 @@
         <p:spPr>
           <a:xfrm>
             <a:off x="457200" y="1600200"/>
-            <a:ext cx="6855480" cy="4523400"/>
+            <a:ext cx="6855120" cy="4523040"/>
           </a:xfrm>
           <a:prstGeom prst="rect">
             <a:avLst/>
@@ -6999,7 +7047,7 @@
             <a:normAutofit/>
           </a:bodyPr>
           <a:p>
-            <a:pPr marL="342720" indent="-340200">
+            <a:pPr marL="342720" indent="-339840">
               <a:lnSpc>
                 <a:spcPct val="100000"/>
               </a:lnSpc>
@@ -7027,7 +7075,7 @@
             </a:endParaRPr>
           </a:p>
           <a:p>
-            <a:pPr marL="342720" indent="-340200">
+            <a:pPr marL="342720" indent="-339840">
               <a:lnSpc>
                 <a:spcPct val="100000"/>
               </a:lnSpc>
@@ -7055,7 +7103,7 @@
             </a:endParaRPr>
           </a:p>
           <a:p>
-            <a:pPr marL="342720" indent="-340200">
+            <a:pPr marL="342720" indent="-339840">
               <a:lnSpc>
                 <a:spcPct val="100000"/>
               </a:lnSpc>
@@ -7083,7 +7131,7 @@
             </a:endParaRPr>
           </a:p>
           <a:p>
-            <a:pPr marL="342720" indent="-340200">
+            <a:pPr marL="342720" indent="-339840">
               <a:lnSpc>
                 <a:spcPct val="100000"/>
               </a:lnSpc>
@@ -7170,7 +7218,7 @@
         <p:spPr>
           <a:xfrm>
             <a:off x="0" y="128520"/>
-            <a:ext cx="7495920" cy="1149480"/>
+            <a:ext cx="7495560" cy="1149120"/>
           </a:xfrm>
           <a:prstGeom prst="rect">
             <a:avLst/>
@@ -7221,7 +7269,7 @@
         <p:spPr>
           <a:xfrm>
             <a:off x="457200" y="1600200"/>
-            <a:ext cx="6764040" cy="4523400"/>
+            <a:ext cx="6763680" cy="4523040"/>
           </a:xfrm>
           <a:prstGeom prst="rect">
             <a:avLst/>
@@ -7242,7 +7290,7 @@
             <a:normAutofit/>
           </a:bodyPr>
           <a:p>
-            <a:pPr marL="342720" indent="-340200">
+            <a:pPr marL="342720" indent="-339840">
               <a:lnSpc>
                 <a:spcPct val="100000"/>
               </a:lnSpc>
@@ -7270,7 +7318,7 @@
             </a:endParaRPr>
           </a:p>
           <a:p>
-            <a:pPr marL="342720" indent="-340200">
+            <a:pPr marL="342720" indent="-339840">
               <a:lnSpc>
                 <a:spcPct val="100000"/>
               </a:lnSpc>
@@ -7308,7 +7356,7 @@
             </a:endParaRPr>
           </a:p>
           <a:p>
-            <a:pPr marL="342720" indent="-340200">
+            <a:pPr marL="342720" indent="-339840">
               <a:lnSpc>
                 <a:spcPct val="100000"/>
               </a:lnSpc>
@@ -7346,7 +7394,7 @@
             </a:endParaRPr>
           </a:p>
           <a:p>
-            <a:pPr marL="342720" indent="-340200">
+            <a:pPr marL="342720" indent="-339840">
               <a:lnSpc>
                 <a:spcPct val="100000"/>
               </a:lnSpc>
@@ -7384,7 +7432,7 @@
             </a:endParaRPr>
           </a:p>
           <a:p>
-            <a:pPr marL="342720" indent="-340200">
+            <a:pPr marL="342720" indent="-339840">
               <a:lnSpc>
                 <a:spcPct val="100000"/>
               </a:lnSpc>
@@ -7491,7 +7539,7 @@
         <p:spPr>
           <a:xfrm>
             <a:off x="0" y="274320"/>
-            <a:ext cx="9142200" cy="1003680"/>
+            <a:ext cx="9141840" cy="1003320"/>
           </a:xfrm>
           <a:prstGeom prst="rect">
             <a:avLst/>
@@ -7552,7 +7600,7 @@
         <p:spPr>
           <a:xfrm>
             <a:off x="169200" y="1456200"/>
-            <a:ext cx="4662360" cy="2657520"/>
+            <a:ext cx="4662000" cy="2657160"/>
           </a:xfrm>
           <a:prstGeom prst="rect">
             <a:avLst/>
@@ -7573,7 +7621,7 @@
             <a:normAutofit/>
           </a:bodyPr>
           <a:p>
-            <a:pPr marL="182880" indent="-340200">
+            <a:pPr marL="182880" indent="-339840">
               <a:lnSpc>
                 <a:spcPct val="100000"/>
               </a:lnSpc>
@@ -7601,7 +7649,7 @@
             </a:endParaRPr>
           </a:p>
           <a:p>
-            <a:pPr marL="182880" indent="-340200">
+            <a:pPr marL="182880" indent="-339840">
               <a:lnSpc>
                 <a:spcPct val="100000"/>
               </a:lnSpc>
@@ -7629,7 +7677,7 @@
             </a:endParaRPr>
           </a:p>
           <a:p>
-            <a:pPr marL="182880" indent="-340200">
+            <a:pPr marL="182880" indent="-339840">
               <a:lnSpc>
                 <a:spcPct val="100000"/>
               </a:lnSpc>
@@ -7657,7 +7705,7 @@
             </a:endParaRPr>
           </a:p>
           <a:p>
-            <a:pPr marL="182880" indent="-340200">
+            <a:pPr marL="182880" indent="-339840">
               <a:lnSpc>
                 <a:spcPct val="100000"/>
               </a:lnSpc>
@@ -7685,7 +7733,7 @@
             </a:endParaRPr>
           </a:p>
           <a:p>
-            <a:pPr marL="182880" indent="-340200">
+            <a:pPr marL="182880" indent="-339840">
               <a:lnSpc>
                 <a:spcPct val="100000"/>
               </a:lnSpc>
@@ -7713,7 +7761,7 @@
             </a:endParaRPr>
           </a:p>
           <a:p>
-            <a:pPr marL="182880" indent="-340200">
+            <a:pPr marL="182880" indent="-339840">
               <a:lnSpc>
                 <a:spcPct val="100000"/>
               </a:lnSpc>
@@ -7807,7 +7855,7 @@
         <p:spPr>
           <a:xfrm>
             <a:off x="6217920" y="2011680"/>
-            <a:ext cx="1970280" cy="2084400"/>
+            <a:ext cx="1969920" cy="2084040"/>
           </a:xfrm>
           <a:prstGeom prst="rect">
             <a:avLst/>
@@ -7885,7 +7933,7 @@
         <p:spPr>
           <a:xfrm>
             <a:off x="0" y="274320"/>
-            <a:ext cx="7497000" cy="1003680"/>
+            <a:ext cx="7496640" cy="1003320"/>
           </a:xfrm>
           <a:prstGeom prst="rect">
             <a:avLst/>
@@ -7946,7 +7994,7 @@
         <p:spPr>
           <a:xfrm>
             <a:off x="169200" y="1456200"/>
-            <a:ext cx="6504840" cy="2657520"/>
+            <a:ext cx="6504480" cy="2657160"/>
           </a:xfrm>
           <a:prstGeom prst="rect">
             <a:avLst/>
@@ -7967,7 +8015,7 @@
             <a:normAutofit/>
           </a:bodyPr>
           <a:p>
-            <a:pPr marL="182880" indent="-340200">
+            <a:pPr marL="182880" indent="-339840">
               <a:lnSpc>
                 <a:spcPct val="100000"/>
               </a:lnSpc>
@@ -7995,7 +8043,7 @@
             </a:endParaRPr>
           </a:p>
           <a:p>
-            <a:pPr marL="420480" indent="-340200">
+            <a:pPr marL="420480" indent="-339840">
               <a:lnSpc>
                 <a:spcPct val="100000"/>
               </a:lnSpc>
@@ -8023,7 +8071,7 @@
             </a:endParaRPr>
           </a:p>
           <a:p>
-            <a:pPr marL="420480" indent="-340200">
+            <a:pPr marL="420480" indent="-339840">
               <a:lnSpc>
                 <a:spcPct val="100000"/>
               </a:lnSpc>
@@ -8071,7 +8119,7 @@
             </a:endParaRPr>
           </a:p>
           <a:p>
-            <a:pPr marL="420480" indent="-340200">
+            <a:pPr marL="420480" indent="-339840">
               <a:lnSpc>
                 <a:spcPct val="100000"/>
               </a:lnSpc>
@@ -8253,7 +8301,7 @@
         <p:spPr>
           <a:xfrm>
             <a:off x="0" y="274320"/>
-            <a:ext cx="7405560" cy="1003680"/>
+            <a:ext cx="7405200" cy="1003320"/>
           </a:xfrm>
           <a:prstGeom prst="rect">
             <a:avLst/>
@@ -8314,7 +8362,7 @@
         <p:spPr>
           <a:xfrm>
             <a:off x="169200" y="1456200"/>
-            <a:ext cx="4662360" cy="2657520"/>
+            <a:ext cx="4662000" cy="2657160"/>
           </a:xfrm>
           <a:prstGeom prst="rect">
             <a:avLst/>
@@ -8335,7 +8383,7 @@
             <a:normAutofit/>
           </a:bodyPr>
           <a:p>
-            <a:pPr marL="182880" indent="-340200">
+            <a:pPr marL="182880" indent="-339840">
               <a:lnSpc>
                 <a:spcPct val="100000"/>
               </a:lnSpc>
@@ -8363,7 +8411,7 @@
             </a:endParaRPr>
           </a:p>
           <a:p>
-            <a:pPr marL="311040" indent="-340200">
+            <a:pPr marL="311040" indent="-339840">
               <a:lnSpc>
                 <a:spcPct val="100000"/>
               </a:lnSpc>
@@ -8391,7 +8439,7 @@
             </a:endParaRPr>
           </a:p>
           <a:p>
-            <a:pPr marL="311040" indent="-340200">
+            <a:pPr marL="311040" indent="-339840">
               <a:lnSpc>
                 <a:spcPct val="100000"/>
               </a:lnSpc>
@@ -8419,7 +8467,7 @@
             </a:endParaRPr>
           </a:p>
           <a:p>
-            <a:pPr marL="311040" indent="-340200">
+            <a:pPr marL="311040" indent="-339840">
               <a:lnSpc>
                 <a:spcPct val="100000"/>
               </a:lnSpc>

</xml_diff>